<commit_message>
second commit after making changes
</commit_message>
<xml_diff>
--- a/Lending_club_case_study.pptx
+++ b/Lending_club_case_study.pptx
@@ -9,6 +9,8 @@
     <p:sldId id="257" r:id="rId3"/>
     <p:sldId id="258" r:id="rId4"/>
     <p:sldId id="259" r:id="rId5"/>
+    <p:sldId id="260" r:id="rId6"/>
+    <p:sldId id="261" r:id="rId7"/>
   </p:sldIdLst>
   <p:sldSz cx="12192000" cy="6858000"/>
   <p:notesSz cx="6858000" cy="9144000"/>
@@ -264,7 +266,7 @@
           <a:p>
             <a:fld id="{101BFF65-A201-44C8-A7FA-A288B2426049}" type="datetimeFigureOut">
               <a:rPr lang="en-IN" smtClean="0"/>
-              <a:t>07-11-2022</a:t>
+              <a:t>09-11-2022</a:t>
             </a:fld>
             <a:endParaRPr lang="en-IN"/>
           </a:p>
@@ -464,7 +466,7 @@
           <a:p>
             <a:fld id="{101BFF65-A201-44C8-A7FA-A288B2426049}" type="datetimeFigureOut">
               <a:rPr lang="en-IN" smtClean="0"/>
-              <a:t>07-11-2022</a:t>
+              <a:t>09-11-2022</a:t>
             </a:fld>
             <a:endParaRPr lang="en-IN"/>
           </a:p>
@@ -674,7 +676,7 @@
           <a:p>
             <a:fld id="{101BFF65-A201-44C8-A7FA-A288B2426049}" type="datetimeFigureOut">
               <a:rPr lang="en-IN" smtClean="0"/>
-              <a:t>07-11-2022</a:t>
+              <a:t>09-11-2022</a:t>
             </a:fld>
             <a:endParaRPr lang="en-IN"/>
           </a:p>
@@ -874,7 +876,7 @@
           <a:p>
             <a:fld id="{101BFF65-A201-44C8-A7FA-A288B2426049}" type="datetimeFigureOut">
               <a:rPr lang="en-IN" smtClean="0"/>
-              <a:t>07-11-2022</a:t>
+              <a:t>09-11-2022</a:t>
             </a:fld>
             <a:endParaRPr lang="en-IN"/>
           </a:p>
@@ -1150,7 +1152,7 @@
           <a:p>
             <a:fld id="{101BFF65-A201-44C8-A7FA-A288B2426049}" type="datetimeFigureOut">
               <a:rPr lang="en-IN" smtClean="0"/>
-              <a:t>07-11-2022</a:t>
+              <a:t>09-11-2022</a:t>
             </a:fld>
             <a:endParaRPr lang="en-IN"/>
           </a:p>
@@ -1418,7 +1420,7 @@
           <a:p>
             <a:fld id="{101BFF65-A201-44C8-A7FA-A288B2426049}" type="datetimeFigureOut">
               <a:rPr lang="en-IN" smtClean="0"/>
-              <a:t>07-11-2022</a:t>
+              <a:t>09-11-2022</a:t>
             </a:fld>
             <a:endParaRPr lang="en-IN"/>
           </a:p>
@@ -1833,7 +1835,7 @@
           <a:p>
             <a:fld id="{101BFF65-A201-44C8-A7FA-A288B2426049}" type="datetimeFigureOut">
               <a:rPr lang="en-IN" smtClean="0"/>
-              <a:t>07-11-2022</a:t>
+              <a:t>09-11-2022</a:t>
             </a:fld>
             <a:endParaRPr lang="en-IN"/>
           </a:p>
@@ -1975,7 +1977,7 @@
           <a:p>
             <a:fld id="{101BFF65-A201-44C8-A7FA-A288B2426049}" type="datetimeFigureOut">
               <a:rPr lang="en-IN" smtClean="0"/>
-              <a:t>07-11-2022</a:t>
+              <a:t>09-11-2022</a:t>
             </a:fld>
             <a:endParaRPr lang="en-IN"/>
           </a:p>
@@ -2088,7 +2090,7 @@
           <a:p>
             <a:fld id="{101BFF65-A201-44C8-A7FA-A288B2426049}" type="datetimeFigureOut">
               <a:rPr lang="en-IN" smtClean="0"/>
-              <a:t>07-11-2022</a:t>
+              <a:t>09-11-2022</a:t>
             </a:fld>
             <a:endParaRPr lang="en-IN"/>
           </a:p>
@@ -2401,7 +2403,7 @@
           <a:p>
             <a:fld id="{101BFF65-A201-44C8-A7FA-A288B2426049}" type="datetimeFigureOut">
               <a:rPr lang="en-IN" smtClean="0"/>
-              <a:t>07-11-2022</a:t>
+              <a:t>09-11-2022</a:t>
             </a:fld>
             <a:endParaRPr lang="en-IN"/>
           </a:p>
@@ -2690,7 +2692,7 @@
           <a:p>
             <a:fld id="{101BFF65-A201-44C8-A7FA-A288B2426049}" type="datetimeFigureOut">
               <a:rPr lang="en-IN" smtClean="0"/>
-              <a:t>07-11-2022</a:t>
+              <a:t>09-11-2022</a:t>
             </a:fld>
             <a:endParaRPr lang="en-IN"/>
           </a:p>
@@ -2933,7 +2935,7 @@
           <a:p>
             <a:fld id="{101BFF65-A201-44C8-A7FA-A288B2426049}" type="datetimeFigureOut">
               <a:rPr lang="en-IN" smtClean="0"/>
-              <a:t>07-11-2022</a:t>
+              <a:t>09-11-2022</a:t>
             </a:fld>
             <a:endParaRPr lang="en-IN"/>
           </a:p>
@@ -3890,6 +3892,384 @@
 </p:sld>
 </file>
 
+<file path=ppt/slides/slide5.xml><?xml version="1.0" encoding="utf-8"?>
+<p:sld xmlns:a="http://schemas.openxmlformats.org/drawingml/2006/main" xmlns:r="http://schemas.openxmlformats.org/officeDocument/2006/relationships" xmlns:p="http://schemas.openxmlformats.org/presentationml/2006/main">
+  <p:cSld>
+    <p:spTree>
+      <p:nvGrpSpPr>
+        <p:cNvPr id="1" name=""/>
+        <p:cNvGrpSpPr/>
+        <p:nvPr/>
+      </p:nvGrpSpPr>
+      <p:grpSpPr>
+        <a:xfrm>
+          <a:off x="0" y="0"/>
+          <a:ext cx="0" cy="0"/>
+          <a:chOff x="0" y="0"/>
+          <a:chExt cx="0" cy="0"/>
+        </a:xfrm>
+      </p:grpSpPr>
+      <p:sp>
+        <p:nvSpPr>
+          <p:cNvPr id="2" name="Title 1">
+            <a:extLst>
+              <a:ext uri="{FF2B5EF4-FFF2-40B4-BE49-F238E27FC236}">
+                <a16:creationId xmlns:a16="http://schemas.microsoft.com/office/drawing/2014/main" id="{AC3C1103-507C-EE13-196A-4BCA925A213F}"/>
+              </a:ext>
+            </a:extLst>
+          </p:cNvPr>
+          <p:cNvSpPr>
+            <a:spLocks noGrp="1"/>
+          </p:cNvSpPr>
+          <p:nvPr>
+            <p:ph type="title"/>
+          </p:nvPr>
+        </p:nvSpPr>
+        <p:spPr/>
+        <p:txBody>
+          <a:bodyPr/>
+          <a:lstStyle/>
+          <a:p>
+            <a:pPr algn="ctr"/>
+            <a:r>
+              <a:rPr lang="en-US" dirty="0"/>
+              <a:t>Visualizations</a:t>
+            </a:r>
+            <a:endParaRPr lang="en-IN" dirty="0"/>
+          </a:p>
+        </p:txBody>
+      </p:sp>
+      <p:sp>
+        <p:nvSpPr>
+          <p:cNvPr id="4" name="Text Placeholder 3">
+            <a:extLst>
+              <a:ext uri="{FF2B5EF4-FFF2-40B4-BE49-F238E27FC236}">
+                <a16:creationId xmlns:a16="http://schemas.microsoft.com/office/drawing/2014/main" id="{611CD95F-D74F-18A0-B936-229301A635A8}"/>
+              </a:ext>
+            </a:extLst>
+          </p:cNvPr>
+          <p:cNvSpPr>
+            <a:spLocks noGrp="1"/>
+          </p:cNvSpPr>
+          <p:nvPr>
+            <p:ph sz="half" idx="2"/>
+          </p:nvPr>
+        </p:nvSpPr>
+        <p:spPr/>
+        <p:txBody>
+          <a:bodyPr/>
+          <a:lstStyle/>
+          <a:p>
+            <a:r>
+              <a:rPr lang="en-US" dirty="0"/>
+              <a:t>This shows how many people have fully paid the loan and how many are defaulted. Around 15% are defaulters.</a:t>
+            </a:r>
+          </a:p>
+          <a:p>
+            <a:endParaRPr lang="en-US" dirty="0"/>
+          </a:p>
+          <a:p>
+            <a:endParaRPr lang="en-IN" dirty="0"/>
+          </a:p>
+        </p:txBody>
+      </p:sp>
+      <p:pic>
+        <p:nvPicPr>
+          <p:cNvPr id="5" name="Picture 2">
+            <a:extLst>
+              <a:ext uri="{FF2B5EF4-FFF2-40B4-BE49-F238E27FC236}">
+                <a16:creationId xmlns:a16="http://schemas.microsoft.com/office/drawing/2014/main" id="{B7819EC8-CC38-7B4E-7E06-B6D2A414CBA0}"/>
+              </a:ext>
+            </a:extLst>
+          </p:cNvPr>
+          <p:cNvPicPr>
+            <a:picLocks noChangeAspect="1" noChangeArrowheads="1"/>
+          </p:cNvPicPr>
+          <p:nvPr/>
+        </p:nvPicPr>
+        <p:blipFill>
+          <a:blip r:embed="rId2">
+            <a:extLst>
+              <a:ext uri="{28A0092B-C50C-407E-A947-70E740481C1C}">
+                <a14:useLocalDpi xmlns:a14="http://schemas.microsoft.com/office/drawing/2010/main" val="0"/>
+              </a:ext>
+            </a:extLst>
+          </a:blip>
+          <a:srcRect/>
+          <a:stretch>
+            <a:fillRect/>
+          </a:stretch>
+        </p:blipFill>
+        <p:spPr bwMode="auto">
+          <a:xfrm>
+            <a:off x="1072089" y="1825625"/>
+            <a:ext cx="4697340" cy="4187866"/>
+          </a:xfrm>
+          <a:prstGeom prst="rect">
+            <a:avLst/>
+          </a:prstGeom>
+          <a:noFill/>
+          <a:extLst>
+            <a:ext uri="{909E8E84-426E-40DD-AFC4-6F175D3DCCD1}">
+              <a14:hiddenFill xmlns:a14="http://schemas.microsoft.com/office/drawing/2010/main">
+                <a:solidFill>
+                  <a:srgbClr val="FFFFFF"/>
+                </a:solidFill>
+              </a14:hiddenFill>
+            </a:ext>
+          </a:extLst>
+        </p:spPr>
+      </p:pic>
+    </p:spTree>
+    <p:extLst>
+      <p:ext uri="{BB962C8B-B14F-4D97-AF65-F5344CB8AC3E}">
+        <p14:creationId xmlns:p14="http://schemas.microsoft.com/office/powerpoint/2010/main" val="1135984558"/>
+      </p:ext>
+    </p:extLst>
+  </p:cSld>
+  <p:clrMapOvr>
+    <a:masterClrMapping/>
+  </p:clrMapOvr>
+</p:sld>
+</file>
+
+<file path=ppt/slides/slide6.xml><?xml version="1.0" encoding="utf-8"?>
+<p:sld xmlns:a="http://schemas.openxmlformats.org/drawingml/2006/main" xmlns:r="http://schemas.openxmlformats.org/officeDocument/2006/relationships" xmlns:p="http://schemas.openxmlformats.org/presentationml/2006/main">
+  <p:cSld>
+    <p:spTree>
+      <p:nvGrpSpPr>
+        <p:cNvPr id="1" name=""/>
+        <p:cNvGrpSpPr/>
+        <p:nvPr/>
+      </p:nvGrpSpPr>
+      <p:grpSpPr>
+        <a:xfrm>
+          <a:off x="0" y="0"/>
+          <a:ext cx="0" cy="0"/>
+          <a:chOff x="0" y="0"/>
+          <a:chExt cx="0" cy="0"/>
+        </a:xfrm>
+      </p:grpSpPr>
+      <p:sp>
+        <p:nvSpPr>
+          <p:cNvPr id="2" name="Title 1">
+            <a:extLst>
+              <a:ext uri="{FF2B5EF4-FFF2-40B4-BE49-F238E27FC236}">
+                <a16:creationId xmlns:a16="http://schemas.microsoft.com/office/drawing/2014/main" id="{AC3C1103-507C-EE13-196A-4BCA925A213F}"/>
+              </a:ext>
+            </a:extLst>
+          </p:cNvPr>
+          <p:cNvSpPr>
+            <a:spLocks noGrp="1"/>
+          </p:cNvSpPr>
+          <p:nvPr>
+            <p:ph type="title"/>
+          </p:nvPr>
+        </p:nvSpPr>
+        <p:spPr>
+          <a:xfrm>
+            <a:off x="838200" y="288925"/>
+            <a:ext cx="10515600" cy="1325563"/>
+          </a:xfrm>
+        </p:spPr>
+        <p:txBody>
+          <a:bodyPr/>
+          <a:lstStyle/>
+          <a:p>
+            <a:pPr algn="ctr"/>
+            <a:r>
+              <a:rPr lang="en-US" dirty="0"/>
+              <a:t>Visualizations</a:t>
+            </a:r>
+            <a:endParaRPr lang="en-IN" dirty="0"/>
+          </a:p>
+        </p:txBody>
+      </p:sp>
+      <p:sp>
+        <p:nvSpPr>
+          <p:cNvPr id="4" name="Text Placeholder 3">
+            <a:extLst>
+              <a:ext uri="{FF2B5EF4-FFF2-40B4-BE49-F238E27FC236}">
+                <a16:creationId xmlns:a16="http://schemas.microsoft.com/office/drawing/2014/main" id="{611CD95F-D74F-18A0-B936-229301A635A8}"/>
+              </a:ext>
+            </a:extLst>
+          </p:cNvPr>
+          <p:cNvSpPr>
+            <a:spLocks noGrp="1"/>
+          </p:cNvSpPr>
+          <p:nvPr>
+            <p:ph sz="half" idx="2"/>
+          </p:nvPr>
+        </p:nvSpPr>
+        <p:spPr>
+          <a:xfrm>
+            <a:off x="7119256" y="1825625"/>
+            <a:ext cx="4234543" cy="4351338"/>
+          </a:xfrm>
+        </p:spPr>
+        <p:txBody>
+          <a:bodyPr/>
+          <a:lstStyle/>
+          <a:p>
+            <a:r>
+              <a:rPr lang="en-US" dirty="0"/>
+              <a:t>This shows the count of people with different home ownership and different loan status. Most of the defaulters either rent or Mortgage a house. Only few of them have their own house.</a:t>
+            </a:r>
+          </a:p>
+          <a:p>
+            <a:endParaRPr lang="en-IN" dirty="0"/>
+          </a:p>
+        </p:txBody>
+      </p:sp>
+      <p:sp>
+        <p:nvSpPr>
+          <p:cNvPr id="7" name="Rectangle 1">
+            <a:extLst>
+              <a:ext uri="{FF2B5EF4-FFF2-40B4-BE49-F238E27FC236}">
+                <a16:creationId xmlns:a16="http://schemas.microsoft.com/office/drawing/2014/main" id="{62ADF9BD-8E12-3096-219D-4C8B19B24BFF}"/>
+              </a:ext>
+            </a:extLst>
+          </p:cNvPr>
+          <p:cNvSpPr>
+            <a:spLocks noChangeArrowheads="1"/>
+          </p:cNvSpPr>
+          <p:nvPr/>
+        </p:nvSpPr>
+        <p:spPr bwMode="auto">
+          <a:xfrm>
+            <a:off x="838200" y="1665973"/>
+            <a:ext cx="6007650" cy="646331"/>
+          </a:xfrm>
+          <a:prstGeom prst="rect">
+            <a:avLst/>
+          </a:prstGeom>
+          <a:noFill/>
+          <a:ln>
+            <a:noFill/>
+          </a:ln>
+          <a:effectLst/>
+          <a:extLst>
+            <a:ext uri="{909E8E84-426E-40DD-AFC4-6F175D3DCCD1}">
+              <a14:hiddenFill xmlns:a14="http://schemas.microsoft.com/office/drawing/2010/main">
+                <a:solidFill>
+                  <a:schemeClr val="accent1"/>
+                </a:solidFill>
+              </a14:hiddenFill>
+            </a:ext>
+            <a:ext uri="{91240B29-F687-4F45-9708-019B960494DF}">
+              <a14:hiddenLine xmlns:a14="http://schemas.microsoft.com/office/drawing/2010/main" w="9525">
+                <a:solidFill>
+                  <a:schemeClr val="tx1"/>
+                </a:solidFill>
+                <a:miter lim="800000"/>
+                <a:headEnd/>
+                <a:tailEnd/>
+              </a14:hiddenLine>
+            </a:ext>
+            <a:ext uri="{AF507438-7753-43E0-B8FC-AC1667EBCBE1}">
+              <a14:hiddenEffects xmlns:a14="http://schemas.microsoft.com/office/drawing/2010/main">
+                <a:effectLst>
+                  <a:outerShdw dist="35921" dir="2700000" algn="ctr" rotWithShape="0">
+                    <a:schemeClr val="bg2"/>
+                  </a:outerShdw>
+                </a:effectLst>
+              </a14:hiddenEffects>
+            </a:ext>
+          </a:extLst>
+        </p:spPr>
+        <p:txBody>
+          <a:bodyPr vert="horz" wrap="square" lIns="91440" tIns="45720" rIns="91440" bIns="45720" numCol="1" anchor="ctr" anchorCtr="0" compatLnSpc="1">
+            <a:prstTxWarp prst="textNoShape">
+              <a:avLst/>
+            </a:prstTxWarp>
+            <a:spAutoFit/>
+          </a:bodyPr>
+          <a:lstStyle/>
+          <a:p>
+            <a:pPr marL="0" marR="0" lvl="0" indent="0" algn="l" defTabSz="914400" rtl="0" eaLnBrk="0" fontAlgn="base" latinLnBrk="0" hangingPunct="0">
+              <a:lnSpc>
+                <a:spcPct val="100000"/>
+              </a:lnSpc>
+              <a:spcBef>
+                <a:spcPct val="0"/>
+              </a:spcBef>
+              <a:spcAft>
+                <a:spcPct val="0"/>
+              </a:spcAft>
+              <a:buClrTx/>
+              <a:buSzTx/>
+              <a:buFontTx/>
+              <a:buNone/>
+              <a:tabLst/>
+            </a:pPr>
+            <a:br>
+              <a:rPr kumimoji="0" lang="en-US" altLang="en-US" sz="1800" b="0" i="0" u="none" strike="noStrike" cap="none" normalizeH="0" baseline="0">
+                <a:ln>
+                  <a:noFill/>
+                </a:ln>
+                <a:solidFill>
+                  <a:schemeClr val="tx1"/>
+                </a:solidFill>
+                <a:effectLst/>
+                <a:latin typeface="Arial" panose="020B0604020202020204" pitchFamily="34" charset="0"/>
+              </a:rPr>
+            </a:br>
+            <a:endParaRPr kumimoji="0" lang="en-US" altLang="en-US" sz="1800" b="0" i="0" u="none" strike="noStrike" cap="none" normalizeH="0" baseline="0">
+              <a:ln>
+                <a:noFill/>
+              </a:ln>
+              <a:solidFill>
+                <a:schemeClr val="tx1"/>
+              </a:solidFill>
+              <a:effectLst/>
+              <a:latin typeface="Arial" panose="020B0604020202020204" pitchFamily="34" charset="0"/>
+            </a:endParaRPr>
+          </a:p>
+        </p:txBody>
+      </p:sp>
+      <p:pic>
+        <p:nvPicPr>
+          <p:cNvPr id="12" name="Picture 11">
+            <a:extLst>
+              <a:ext uri="{FF2B5EF4-FFF2-40B4-BE49-F238E27FC236}">
+                <a16:creationId xmlns:a16="http://schemas.microsoft.com/office/drawing/2014/main" id="{041180D2-E682-F75F-F6B9-16E7C2B39B31}"/>
+              </a:ext>
+            </a:extLst>
+          </p:cNvPr>
+          <p:cNvPicPr>
+            <a:picLocks noChangeAspect="1"/>
+          </p:cNvPicPr>
+          <p:nvPr/>
+        </p:nvPicPr>
+        <p:blipFill>
+          <a:blip r:embed="rId2"/>
+          <a:stretch>
+            <a:fillRect/>
+          </a:stretch>
+        </p:blipFill>
+        <p:spPr>
+          <a:xfrm>
+            <a:off x="1222563" y="1971658"/>
+            <a:ext cx="5238924" cy="2914683"/>
+          </a:xfrm>
+          <a:prstGeom prst="rect">
+            <a:avLst/>
+          </a:prstGeom>
+        </p:spPr>
+      </p:pic>
+    </p:spTree>
+    <p:extLst>
+      <p:ext uri="{BB962C8B-B14F-4D97-AF65-F5344CB8AC3E}">
+        <p14:creationId xmlns:p14="http://schemas.microsoft.com/office/powerpoint/2010/main" val="1187481988"/>
+      </p:ext>
+    </p:extLst>
+  </p:cSld>
+  <p:clrMapOvr>
+    <a:masterClrMapping/>
+  </p:clrMapOvr>
+</p:sld>
+</file>
+
 <file path=ppt/theme/theme1.xml><?xml version="1.0" encoding="utf-8"?>
 <a:theme xmlns:a="http://schemas.openxmlformats.org/drawingml/2006/main" name="Office Theme">
   <a:themeElements>

</xml_diff>